<commit_message>
Added final report for project 2
</commit_message>
<xml_diff>
--- a/deliverables/Robotics Project 2 Presentation.pptx
+++ b/deliverables/Robotics Project 2 Presentation.pptx
@@ -10909,12 +10909,42 @@
             </a:pPr>
             <a:r>
               <a:rPr lang="en"/>
-              <a:t>Media</a:t>
+              <a:t>Theater Play</a:t>
             </a:r>
             <a:endParaRPr/>
           </a:p>
         </p:txBody>
       </p:sp>
+      <p:pic>
+        <p:nvPicPr>
+          <p:cNvPr id="183" name="Google Shape;183;p21" title="VID_20181208_162915375.mp4">
+            <a:hlinkClick r:id="rId3"/>
+          </p:cNvPr>
+          <p:cNvPicPr preferRelativeResize="0"/>
+          <p:nvPr/>
+        </p:nvPicPr>
+        <p:blipFill>
+          <a:blip r:embed="rId4">
+            <a:alphaModFix/>
+          </a:blip>
+          <a:stretch>
+            <a:fillRect/>
+          </a:stretch>
+        </p:blipFill>
+        <p:spPr>
+          <a:xfrm>
+            <a:off x="2060113" y="1008250"/>
+            <a:ext cx="5513675" cy="4135250"/>
+          </a:xfrm>
+          <a:prstGeom prst="rect">
+            <a:avLst/>
+          </a:prstGeom>
+          <a:noFill/>
+          <a:ln>
+            <a:noFill/>
+          </a:ln>
+        </p:spPr>
+      </p:pic>
     </p:spTree>
   </p:cSld>
   <p:clrMapOvr>

</xml_diff>